<commit_message>
modified:   Swift short term optimizer.pptx 	modified:   swift.py
</commit_message>
<xml_diff>
--- a/Swift short term optimizer.pptx
+++ b/Swift short term optimizer.pptx
@@ -3554,51 +3554,19 @@
           <a:p>
             <a:r>
               <a:rPr lang="en-US" dirty="0" smtClean="0"/>
-              <a:t>Two Fb Targets: </a:t>
-            </a:r>
-            <a:r>
-              <a:rPr lang="en-US" dirty="0" smtClean="0"/>
-              <a:t>925 </a:t>
-            </a:r>
-            <a:r>
-              <a:rPr lang="en-US" dirty="0" smtClean="0"/>
-              <a:t>and </a:t>
-            </a:r>
-            <a:r>
-              <a:rPr lang="en-US" dirty="0" smtClean="0"/>
-              <a:t>935 </a:t>
-            </a:r>
-          </a:p>
-          <a:p>
-            <a:r>
-              <a:rPr lang="en-US" dirty="0" smtClean="0"/>
-              <a:t>Random </a:t>
-            </a:r>
-            <a:r>
-              <a:rPr lang="en-US" dirty="0" smtClean="0"/>
-              <a:t>Generation Targets</a:t>
-            </a:r>
-          </a:p>
-          <a:p>
-            <a:r>
-              <a:rPr lang="en-US" dirty="0" smtClean="0"/>
-              <a:t>2</a:t>
-            </a:r>
-            <a:r>
-              <a:rPr lang="en-US" dirty="0" smtClean="0"/>
-              <a:t>-5 </a:t>
-            </a:r>
-            <a:r>
-              <a:rPr lang="en-US" dirty="0" smtClean="0"/>
-              <a:t>minutes to find a decent solution for an </a:t>
-            </a:r>
-            <a:r>
-              <a:rPr lang="en-US" dirty="0" smtClean="0"/>
-              <a:t>3-month model </a:t>
-            </a:r>
-            <a:r>
-              <a:rPr lang="en-US" dirty="0" smtClean="0"/>
-              <a:t>with daily gen targets</a:t>
+              <a:t>Two Fb Targets: 925 and 935 </a:t>
+            </a:r>
+          </a:p>
+          <a:p>
+            <a:r>
+              <a:rPr lang="en-US" dirty="0" smtClean="0"/>
+              <a:t>Random Generation Targets</a:t>
+            </a:r>
+          </a:p>
+          <a:p>
+            <a:r>
+              <a:rPr lang="en-US" dirty="0" smtClean="0"/>
+              <a:t>2-5 minutes to find a decent solution for an 3-month model with daily gen targets</a:t>
             </a:r>
           </a:p>
           <a:p>
@@ -3820,15 +3788,7 @@
             <a:pPr lvl="1"/>
             <a:r>
               <a:rPr lang="en-US" dirty="0" smtClean="0"/>
-              <a:t>Content </a:t>
-            </a:r>
-            <a:r>
-              <a:rPr lang="en-US" dirty="0" smtClean="0"/>
-              <a:t>function is not </a:t>
-            </a:r>
-            <a:r>
-              <a:rPr lang="en-US" dirty="0" smtClean="0"/>
-              <a:t>linear or quadratic</a:t>
+              <a:t>Content function is not linear or quadratic</a:t>
             </a:r>
           </a:p>
           <a:p>
@@ -3848,11 +3808,7 @@
           <a:p>
             <a:r>
               <a:rPr lang="en-US" dirty="0" smtClean="0"/>
-              <a:t>Any </a:t>
-            </a:r>
-            <a:r>
-              <a:rPr lang="en-US" dirty="0" smtClean="0"/>
-              <a:t>other PUD with dispatch-able hydro project?</a:t>
+              <a:t>Any other PUD with dispatch-able hydro project?</a:t>
             </a:r>
           </a:p>
         </p:txBody>
@@ -3999,15 +3955,7 @@
           <a:p>
             <a:r>
               <a:rPr lang="en-US" dirty="0" smtClean="0"/>
-              <a:t>A short term optimizer that can optimize the daily generation for a given period </a:t>
-            </a:r>
-            <a:r>
-              <a:rPr lang="en-US" dirty="0" smtClean="0"/>
-              <a:t>(one </a:t>
-            </a:r>
-            <a:r>
-              <a:rPr lang="en-US" dirty="0" smtClean="0"/>
-              <a:t>month up to a year)</a:t>
+              <a:t>A short term optimizer that can optimize the daily generation for a given period (one month up to a year)</a:t>
             </a:r>
           </a:p>
           <a:p>
@@ -4077,13 +4025,8 @@
           <a:p>
             <a:r>
               <a:rPr lang="en-US" dirty="0" smtClean="0"/>
-              <a:t>A perfect opportunity to study </a:t>
-            </a:r>
-            <a:r>
-              <a:rPr lang="en-US" dirty="0" smtClean="0"/>
-              <a:t>quadratic optimization</a:t>
-            </a:r>
-            <a:endParaRPr lang="en-US" dirty="0" smtClean="0"/>
+              <a:t>A perfect opportunity to study quadratic optimization</a:t>
+            </a:r>
           </a:p>
           <a:p>
             <a:pPr lvl="1"/>
@@ -4229,11 +4172,7 @@
             </a:r>
             <a:r>
               <a:rPr lang="en-US" dirty="0" smtClean="0"/>
-              <a:t> = </a:t>
-            </a:r>
-            <a:r>
-              <a:rPr lang="en-US" dirty="0" smtClean="0"/>
-              <a:t>0.0078Fb</a:t>
+              <a:t> = 0.0078Fb</a:t>
             </a:r>
             <a:r>
               <a:rPr lang="en-US" baseline="30000" dirty="0"/>
@@ -4323,11 +4262,7 @@
           <a:p>
             <a:r>
               <a:rPr lang="en-US" dirty="0" smtClean="0"/>
-              <a:t>Gen </a:t>
-            </a:r>
-            <a:r>
-              <a:rPr lang="en-US" dirty="0" smtClean="0"/>
-              <a:t>= </a:t>
+              <a:t>Gen = </a:t>
             </a:r>
             <a:r>
               <a:rPr lang="en-US" dirty="0" err="1" smtClean="0"/>
@@ -4546,20 +4481,16 @@
           <a:p>
             <a:pPr lvl="1"/>
             <a:r>
-              <a:rPr lang="en-US" dirty="0" smtClean="0"/>
-              <a:t>\</a:t>
-            </a:r>
-            <a:r>
-              <a:rPr lang="en-US" dirty="0" err="1" smtClean="0"/>
-              <a:t>sum_i</a:t>
-            </a:r>
-            <a:r>
-              <a:rPr lang="en-US" dirty="0" smtClean="0"/>
-              <a:t> (Prices[</a:t>
-            </a:r>
-            <a:r>
-              <a:rPr lang="en-US" dirty="0" err="1" smtClean="0"/>
-              <a:t>i</a:t>
+              <a:rPr lang="el-GR" dirty="0" smtClean="0"/>
+              <a:t>Σ</a:t>
+            </a:r>
+            <a:r>
+              <a:rPr lang="en-US" baseline="-25000" dirty="0"/>
+              <a:t>i </a:t>
+            </a:r>
+            <a:r>
+              <a:rPr lang="en-US" dirty="0" smtClean="0"/>
+              <a:t>(Prices[i</a:t>
             </a:r>
             <a:r>
               <a:rPr lang="en-US" dirty="0" smtClean="0"/>
@@ -4571,15 +4502,7 @@
             </a:r>
             <a:r>
               <a:rPr lang="en-US" dirty="0" smtClean="0"/>
-              <a:t>[</a:t>
-            </a:r>
-            <a:r>
-              <a:rPr lang="en-US" dirty="0" err="1" smtClean="0"/>
-              <a:t>i</a:t>
-            </a:r>
-            <a:r>
-              <a:rPr lang="en-US" dirty="0" smtClean="0"/>
-              <a:t>] * </a:t>
+              <a:t>[i] * </a:t>
             </a:r>
             <a:r>
               <a:rPr lang="en-US" dirty="0" err="1" smtClean="0"/>
@@ -4587,23 +4510,7 @@
             </a:r>
             <a:r>
               <a:rPr lang="en-US" dirty="0" smtClean="0"/>
-              <a:t>[</a:t>
-            </a:r>
-            <a:r>
-              <a:rPr lang="en-US" dirty="0" err="1" smtClean="0"/>
-              <a:t>i</a:t>
-            </a:r>
-            <a:r>
-              <a:rPr lang="en-US" dirty="0" smtClean="0"/>
-              <a:t>]), </a:t>
-            </a:r>
-            <a:r>
-              <a:rPr lang="en-US" dirty="0" err="1" smtClean="0"/>
-              <a:t>i</a:t>
-            </a:r>
-            <a:r>
-              <a:rPr lang="en-US" dirty="0" smtClean="0"/>
-              <a:t> = 1,…,n</a:t>
+              <a:t>[i]), i = 1,…,n</a:t>
             </a:r>
           </a:p>
           <a:p>
@@ -4635,16 +4542,12 @@
           <a:p>
             <a:pPr marL="457200" lvl="2"/>
             <a:r>
-              <a:rPr lang="en-US" dirty="0"/>
-              <a:t>\</a:t>
-            </a:r>
-            <a:r>
-              <a:rPr lang="en-US" dirty="0" err="1"/>
-              <a:t>sum_i</a:t>
-            </a:r>
-            <a:r>
-              <a:rPr lang="en-US" dirty="0"/>
-              <a:t> </a:t>
+              <a:rPr lang="el-GR" dirty="0" smtClean="0"/>
+              <a:t>Σ</a:t>
+            </a:r>
+            <a:r>
+              <a:rPr lang="en-US" baseline="-25000" dirty="0"/>
+              <a:t>i</a:t>
             </a:r>
             <a:r>
               <a:rPr lang="en-US" dirty="0" smtClean="0"/>
@@ -4656,11 +4559,7 @@
             </a:r>
             <a:r>
               <a:rPr lang="en-US" dirty="0" smtClean="0"/>
-              <a:t>[</a:t>
-            </a:r>
-            <a:r>
-              <a:rPr lang="en-US" dirty="0" err="1" smtClean="0"/>
-              <a:t>i</a:t>
+              <a:t>[i</a:t>
             </a:r>
             <a:r>
               <a:rPr lang="en-US" dirty="0"/>
@@ -4672,11 +4571,7 @@
             </a:r>
             <a:r>
               <a:rPr lang="en-US" dirty="0" smtClean="0"/>
-              <a:t>[</a:t>
-            </a:r>
-            <a:r>
-              <a:rPr lang="en-US" dirty="0" err="1" smtClean="0"/>
-              <a:t>i</a:t>
+              <a:t>[i</a:t>
             </a:r>
             <a:r>
               <a:rPr lang="en-US" dirty="0"/>
@@ -4688,11 +4583,7 @@
             </a:r>
             <a:r>
               <a:rPr lang="en-US" dirty="0" smtClean="0"/>
-              <a:t>[</a:t>
-            </a:r>
-            <a:r>
-              <a:rPr lang="en-US" dirty="0" err="1" smtClean="0"/>
-              <a:t>i</a:t>
+              <a:t>[i</a:t>
             </a:r>
             <a:r>
               <a:rPr lang="en-US" dirty="0"/>
@@ -4722,16 +4613,12 @@
               <a:buSzPct val="85000"/>
             </a:pPr>
             <a:r>
-              <a:rPr lang="en-US" dirty="0"/>
-              <a:t>\</a:t>
-            </a:r>
-            <a:r>
-              <a:rPr lang="en-US" dirty="0" err="1"/>
-              <a:t>sum_i</a:t>
-            </a:r>
-            <a:r>
-              <a:rPr lang="en-US" dirty="0"/>
-              <a:t> </a:t>
+              <a:rPr lang="el-GR" dirty="0" smtClean="0"/>
+              <a:t>Σ</a:t>
+            </a:r>
+            <a:r>
+              <a:rPr lang="en-US" baseline="-25000" dirty="0"/>
+              <a:t>i </a:t>
             </a:r>
             <a:r>
               <a:rPr lang="en-US" dirty="0" smtClean="0"/>
@@ -4743,11 +4630,7 @@
             </a:r>
             <a:r>
               <a:rPr lang="en-US" dirty="0" smtClean="0"/>
-              <a:t>[</a:t>
-            </a:r>
-            <a:r>
-              <a:rPr lang="en-US" dirty="0" err="1" smtClean="0"/>
-              <a:t>i</a:t>
+              <a:t>[i</a:t>
             </a:r>
             <a:r>
               <a:rPr lang="en-US" dirty="0"/>
@@ -4767,11 +4650,7 @@
             </a:r>
             <a:r>
               <a:rPr lang="en-US" dirty="0" smtClean="0"/>
-              <a:t>Gen[</a:t>
-            </a:r>
-            <a:r>
-              <a:rPr lang="en-US" dirty="0" err="1" smtClean="0"/>
-              <a:t>i</a:t>
+              <a:t>Gen[i</a:t>
             </a:r>
             <a:r>
               <a:rPr lang="en-US" dirty="0"/>
@@ -4783,11 +4662,7 @@
             </a:r>
             <a:r>
               <a:rPr lang="en-US" dirty="0" smtClean="0"/>
-              <a:t>[</a:t>
-            </a:r>
-            <a:r>
-              <a:rPr lang="en-US" dirty="0" err="1" smtClean="0"/>
-              <a:t>i</a:t>
+              <a:t>[i</a:t>
             </a:r>
             <a:r>
               <a:rPr lang="en-US" dirty="0"/>
@@ -4916,20 +4791,16 @@
           <a:p>
             <a:pPr marL="457200" lvl="2"/>
             <a:r>
-              <a:rPr lang="en-US" dirty="0"/>
-              <a:t>\</a:t>
-            </a:r>
-            <a:r>
-              <a:rPr lang="en-US" dirty="0" err="1"/>
-              <a:t>sum_i</a:t>
-            </a:r>
-            <a:r>
-              <a:rPr lang="en-US" dirty="0"/>
-              <a:t> (Prices[</a:t>
-            </a:r>
-            <a:r>
-              <a:rPr lang="en-US" dirty="0" err="1"/>
-              <a:t>i</a:t>
+              <a:rPr lang="el-GR" dirty="0" smtClean="0"/>
+              <a:t>Σ</a:t>
+            </a:r>
+            <a:r>
+              <a:rPr lang="en-US" baseline="-25000" dirty="0"/>
+              <a:t>i </a:t>
+            </a:r>
+            <a:r>
+              <a:rPr lang="en-US" dirty="0" smtClean="0"/>
+              <a:t>(Prices[i</a:t>
             </a:r>
             <a:r>
               <a:rPr lang="en-US" dirty="0"/>
@@ -4941,15 +4812,7 @@
             </a:r>
             <a:r>
               <a:rPr lang="en-US" dirty="0"/>
-              <a:t>[</a:t>
-            </a:r>
-            <a:r>
-              <a:rPr lang="en-US" dirty="0" err="1"/>
-              <a:t>i</a:t>
-            </a:r>
-            <a:r>
-              <a:rPr lang="en-US" dirty="0"/>
-              <a:t>] * </a:t>
+              <a:t>[i] * </a:t>
             </a:r>
             <a:r>
               <a:rPr lang="en-US" dirty="0" err="1"/>
@@ -4957,23 +4820,7 @@
             </a:r>
             <a:r>
               <a:rPr lang="en-US" dirty="0"/>
-              <a:t>[</a:t>
-            </a:r>
-            <a:r>
-              <a:rPr lang="en-US" dirty="0" err="1"/>
-              <a:t>i</a:t>
-            </a:r>
-            <a:r>
-              <a:rPr lang="en-US" dirty="0"/>
-              <a:t>]), </a:t>
-            </a:r>
-            <a:r>
-              <a:rPr lang="en-US" dirty="0" err="1"/>
-              <a:t>i</a:t>
-            </a:r>
-            <a:r>
-              <a:rPr lang="en-US" dirty="0"/>
-              <a:t> = 1,…,n</a:t>
+              <a:t>[i]), i = 1,…,n</a:t>
             </a:r>
           </a:p>
           <a:p>
@@ -4993,11 +4840,7 @@
             </a:r>
             <a:r>
               <a:rPr lang="en-US" dirty="0" smtClean="0"/>
-              <a:t>Convexity</a:t>
-            </a:r>
-            <a:r>
-              <a:rPr lang="en-US" dirty="0" smtClean="0"/>
-              <a:t>!</a:t>
+              <a:t>Convexity!</a:t>
             </a:r>
           </a:p>
           <a:p>
@@ -5087,7 +4930,6 @@
               <a:rPr lang="en-US" dirty="0" smtClean="0"/>
               <a:t>Absolute values are hard to model if it contains non-linear term</a:t>
             </a:r>
-            <a:endParaRPr lang="en-US" dirty="0" smtClean="0"/>
           </a:p>
           <a:p>
             <a:endParaRPr lang="en-US" dirty="0" smtClean="0"/>
@@ -5185,28 +5027,24 @@
               <a:buSzPct val="85000"/>
             </a:pPr>
             <a:r>
-              <a:rPr lang="en-US" dirty="0"/>
-              <a:t>\</a:t>
-            </a:r>
-            <a:r>
-              <a:rPr lang="en-US" dirty="0" err="1"/>
-              <a:t>sum_i</a:t>
-            </a:r>
-            <a:r>
-              <a:rPr lang="en-US" dirty="0"/>
-              <a:t> (</a:t>
-            </a:r>
-            <a:r>
-              <a:rPr lang="en-US" dirty="0" err="1"/>
+              <a:rPr lang="el-GR" dirty="0" smtClean="0"/>
+              <a:t>Σ</a:t>
+            </a:r>
+            <a:r>
+              <a:rPr lang="en-US" baseline="-25000" dirty="0" smtClean="0"/>
+              <a:t>i</a:t>
+            </a:r>
+            <a:r>
+              <a:rPr lang="en-US" dirty="0" smtClean="0"/>
+              <a:t>(</a:t>
+            </a:r>
+            <a:r>
+              <a:rPr lang="en-US" dirty="0" err="1" smtClean="0"/>
               <a:t>gen_target_penalty</a:t>
             </a:r>
             <a:r>
-              <a:rPr lang="en-US" dirty="0"/>
-              <a:t>[</a:t>
-            </a:r>
-            <a:r>
-              <a:rPr lang="en-US" dirty="0" err="1"/>
-              <a:t>i</a:t>
+              <a:rPr lang="en-US" dirty="0" smtClean="0"/>
+              <a:t>[i</a:t>
             </a:r>
             <a:r>
               <a:rPr lang="en-US" dirty="0"/>
@@ -5222,15 +5060,7 @@
             </a:r>
             <a:r>
               <a:rPr lang="en-US" dirty="0"/>
-              <a:t> Gen[</a:t>
-            </a:r>
-            <a:r>
-              <a:rPr lang="en-US" dirty="0" err="1"/>
-              <a:t>i</a:t>
-            </a:r>
-            <a:r>
-              <a:rPr lang="en-US" dirty="0"/>
-              <a:t>] – </a:t>
+              <a:t> Gen[i] – </a:t>
             </a:r>
             <a:r>
               <a:rPr lang="en-US" dirty="0" err="1"/>
@@ -5238,15 +5068,7 @@
             </a:r>
             <a:r>
               <a:rPr lang="en-US" dirty="0"/>
-              <a:t>*[</a:t>
-            </a:r>
-            <a:r>
-              <a:rPr lang="en-US" dirty="0" err="1"/>
-              <a:t>i</a:t>
-            </a:r>
-            <a:r>
-              <a:rPr lang="en-US" dirty="0"/>
-              <a:t>] </a:t>
+              <a:t>*[i] </a:t>
             </a:r>
             <a:r>
               <a:rPr lang="en-US" dirty="0">
@@ -5345,11 +5167,7 @@
           <a:p>
             <a:r>
               <a:rPr lang="en-US" dirty="0" smtClean="0"/>
-              <a:t>x * y = </a:t>
-            </a:r>
-            <a:r>
-              <a:rPr lang="en-US" dirty="0" smtClean="0"/>
-              <a:t>u</a:t>
+              <a:t>x * y = u</a:t>
             </a:r>
             <a:r>
               <a:rPr lang="en-US" baseline="30000" dirty="0" smtClean="0"/>
@@ -5357,15 +5175,7 @@
             </a:r>
             <a:r>
               <a:rPr lang="en-US" dirty="0" smtClean="0"/>
-              <a:t> </a:t>
-            </a:r>
-            <a:r>
-              <a:rPr lang="en-US" dirty="0" smtClean="0"/>
-              <a:t>– </a:t>
-            </a:r>
-            <a:r>
-              <a:rPr lang="en-US" dirty="0" smtClean="0"/>
-              <a:t>v</a:t>
+              <a:t> – v</a:t>
             </a:r>
             <a:r>
               <a:rPr lang="en-US" baseline="30000" dirty="0"/>
@@ -5373,11 +5183,7 @@
             </a:r>
             <a:r>
               <a:rPr lang="en-US" dirty="0" smtClean="0"/>
-              <a:t> </a:t>
-            </a:r>
-            <a:r>
-              <a:rPr lang="en-US" dirty="0" smtClean="0"/>
-              <a:t>where u = (</a:t>
+              <a:t> where u = (</a:t>
             </a:r>
             <a:r>
               <a:rPr lang="en-US" dirty="0" err="1" smtClean="0"/>
@@ -5401,12 +5207,16 @@
               <a:t>Σ</a:t>
             </a:r>
             <a:r>
-              <a:rPr lang="en-US" dirty="0" smtClean="0"/>
-              <a:t>(Prices[</a:t>
-            </a:r>
-            <a:r>
-              <a:rPr lang="en-US" dirty="0" err="1" smtClean="0"/>
-              <a:t>i</a:t>
+              <a:rPr lang="en-US" baseline="-25000" dirty="0"/>
+              <a:t>i </a:t>
+            </a:r>
+            <a:r>
+              <a:rPr lang="en-US" dirty="0" smtClean="0"/>
+              <a:t>(</a:t>
+            </a:r>
+            <a:r>
+              <a:rPr lang="en-US" dirty="0" smtClean="0"/>
+              <a:t>Prices[i</a:t>
             </a:r>
             <a:r>
               <a:rPr lang="en-US" dirty="0"/>
@@ -5418,67 +5228,47 @@
             </a:r>
             <a:r>
               <a:rPr lang="en-US" dirty="0"/>
-              <a:t>[</a:t>
+              <a:t>[i] * </a:t>
             </a:r>
             <a:r>
               <a:rPr lang="en-US" dirty="0" err="1"/>
-              <a:t>i</a:t>
+              <a:t>Hk</a:t>
+            </a:r>
+            <a:r>
+              <a:rPr lang="en-US" dirty="0"/>
+              <a:t>[i</a:t>
+            </a:r>
+            <a:r>
+              <a:rPr lang="en-US" dirty="0" smtClean="0"/>
+              <a:t>]) 	</a:t>
+            </a:r>
+            <a:r>
+              <a:rPr lang="el-GR" dirty="0"/>
+              <a:t> </a:t>
+            </a:r>
+            <a:r>
+              <a:rPr lang="en-US" dirty="0" smtClean="0"/>
+              <a:t>      </a:t>
+            </a:r>
+            <a:r>
+              <a:rPr lang="el-GR" dirty="0" smtClean="0"/>
+              <a:t>Σ</a:t>
+            </a:r>
+            <a:r>
+              <a:rPr lang="en-US" baseline="-25000" dirty="0"/>
+              <a:t>i </a:t>
+            </a:r>
+            <a:r>
+              <a:rPr lang="en-US" dirty="0" smtClean="0"/>
+              <a:t>(Prices[i</a:t>
             </a:r>
             <a:r>
               <a:rPr lang="en-US" dirty="0"/>
               <a:t>] * </a:t>
             </a:r>
             <a:r>
-              <a:rPr lang="en-US" dirty="0" err="1"/>
-              <a:t>Hk</a:t>
-            </a:r>
-            <a:r>
-              <a:rPr lang="en-US" dirty="0"/>
-              <a:t>[</a:t>
-            </a:r>
-            <a:r>
-              <a:rPr lang="en-US" dirty="0" err="1"/>
-              <a:t>i</a:t>
-            </a:r>
-            <a:r>
-              <a:rPr lang="en-US" dirty="0" smtClean="0"/>
-              <a:t>]) 	</a:t>
-            </a:r>
-            <a:r>
-              <a:rPr lang="el-GR" dirty="0"/>
-              <a:t> </a:t>
-            </a:r>
-            <a:r>
-              <a:rPr lang="en-US" dirty="0" smtClean="0"/>
-              <a:t>      </a:t>
-            </a:r>
-            <a:r>
-              <a:rPr lang="el-GR" dirty="0" smtClean="0"/>
-              <a:t>Σ</a:t>
-            </a:r>
-            <a:r>
-              <a:rPr lang="en-US" dirty="0" smtClean="0"/>
-              <a:t>(Prices[</a:t>
-            </a:r>
-            <a:r>
-              <a:rPr lang="en-US" dirty="0" err="1" smtClean="0"/>
-              <a:t>i</a:t>
-            </a:r>
-            <a:r>
-              <a:rPr lang="en-US" dirty="0"/>
-              <a:t>] * </a:t>
-            </a:r>
-            <a:r>
-              <a:rPr lang="en-US" dirty="0" smtClean="0"/>
-              <a:t>(u[</a:t>
-            </a:r>
-            <a:r>
-              <a:rPr lang="en-US" dirty="0" err="1" smtClean="0"/>
-              <a:t>i</a:t>
-            </a:r>
-            <a:r>
-              <a:rPr lang="en-US" dirty="0" smtClean="0"/>
-              <a:t>]</a:t>
+              <a:rPr lang="en-US" dirty="0" smtClean="0"/>
+              <a:t>(u[i]</a:t>
             </a:r>
             <a:r>
               <a:rPr lang="en-US" baseline="30000" dirty="0"/>
@@ -5486,19 +5276,7 @@
             </a:r>
             <a:r>
               <a:rPr lang="en-US" dirty="0" smtClean="0"/>
-              <a:t>+ </a:t>
-            </a:r>
-            <a:r>
-              <a:rPr lang="en-US" dirty="0" smtClean="0"/>
-              <a:t>v[</a:t>
-            </a:r>
-            <a:r>
-              <a:rPr lang="en-US" dirty="0" err="1" smtClean="0"/>
-              <a:t>i</a:t>
-            </a:r>
-            <a:r>
-              <a:rPr lang="en-US" dirty="0" smtClean="0"/>
-              <a:t>]</a:t>
+              <a:t>+ v[i]</a:t>
             </a:r>
             <a:r>
               <a:rPr lang="en-US" baseline="30000" dirty="0"/>
@@ -5508,16 +5286,11 @@
               <a:rPr lang="en-US" dirty="0" smtClean="0"/>
               <a:t>))</a:t>
             </a:r>
-            <a:endParaRPr lang="en-US" dirty="0" smtClean="0"/>
-          </a:p>
-          <a:p>
-            <a:r>
-              <a:rPr lang="en-US" dirty="0" smtClean="0"/>
-              <a:t>Then use piecewise linear (PWL) </a:t>
-            </a:r>
-            <a:r>
-              <a:rPr lang="en-US" dirty="0" smtClean="0"/>
-              <a:t>objective for u</a:t>
+          </a:p>
+          <a:p>
+            <a:r>
+              <a:rPr lang="en-US" dirty="0" smtClean="0"/>
+              <a:t>Then use piecewise linear (PWL) objective for u</a:t>
             </a:r>
             <a:r>
               <a:rPr lang="en-US" baseline="30000" dirty="0"/>
@@ -5525,15 +5298,7 @@
             </a:r>
             <a:r>
               <a:rPr lang="en-US" dirty="0" smtClean="0"/>
-              <a:t> </a:t>
-            </a:r>
-            <a:r>
-              <a:rPr lang="en-US" dirty="0" smtClean="0"/>
-              <a:t>and </a:t>
-            </a:r>
-            <a:r>
-              <a:rPr lang="en-US" dirty="0" smtClean="0"/>
-              <a:t>v</a:t>
+              <a:t> and v</a:t>
             </a:r>
             <a:r>
               <a:rPr lang="en-US" baseline="30000" dirty="0"/>
@@ -5541,11 +5306,7 @@
             </a:r>
             <a:r>
               <a:rPr lang="en-US" dirty="0" smtClean="0"/>
-              <a:t>, </a:t>
-            </a:r>
-            <a:r>
-              <a:rPr lang="en-US" dirty="0" smtClean="0"/>
-              <a:t>respectively.</a:t>
+              <a:t>, respectively.</a:t>
             </a:r>
           </a:p>
           <a:p>
@@ -5576,26 +5337,14 @@
             <a:pPr lvl="1"/>
             <a:r>
               <a:rPr lang="en-US" dirty="0" smtClean="0"/>
-              <a:t>At </a:t>
-            </a:r>
-            <a:r>
-              <a:rPr lang="en-US" dirty="0" smtClean="0"/>
-              <a:t>most two are non-negative</a:t>
+              <a:t>At most two are non-negative</a:t>
             </a:r>
           </a:p>
           <a:p>
             <a:pPr lvl="1"/>
             <a:r>
               <a:rPr lang="en-US" dirty="0" smtClean="0"/>
-              <a:t>Non-negative ones </a:t>
-            </a:r>
-            <a:r>
-              <a:rPr lang="en-US" dirty="0" smtClean="0"/>
-              <a:t>must be </a:t>
-            </a:r>
-            <a:r>
-              <a:rPr lang="en-US" dirty="0" smtClean="0"/>
-              <a:t>adjacent</a:t>
+              <a:t>Non-negative ones must be adjacent</a:t>
             </a:r>
           </a:p>
           <a:p>
@@ -5628,7 +5377,7 @@
         </p:nvSpPr>
         <p:spPr>
           <a:xfrm>
-            <a:off x="3886200" y="2514600"/>
+            <a:off x="3886200" y="2566869"/>
             <a:ext cx="609600" cy="152400"/>
           </a:xfrm>
           <a:prstGeom prst="rightArrow">
@@ -5870,11 +5619,7 @@
             </a:r>
             <a:r>
               <a:rPr lang="en-US" dirty="0" smtClean="0"/>
-              <a:t>-c</a:t>
-            </a:r>
-            <a:r>
-              <a:rPr lang="en-US" dirty="0" smtClean="0"/>
-              <a:t>)</a:t>
+              <a:t>-c)</a:t>
             </a:r>
             <a:r>
               <a:rPr lang="en-US" baseline="30000" dirty="0"/>
@@ -5882,11 +5627,7 @@
             </a:r>
             <a:r>
               <a:rPr lang="en-US" dirty="0" smtClean="0"/>
-              <a:t> </a:t>
-            </a:r>
-            <a:r>
-              <a:rPr lang="en-US" dirty="0" smtClean="0"/>
-              <a:t>= </a:t>
+              <a:t> = </a:t>
             </a:r>
             <a:r>
               <a:rPr lang="en-US" dirty="0">
@@ -5922,15 +5663,7 @@
             </a:r>
             <a:r>
               <a:rPr lang="en-US" dirty="0" smtClean="0"/>
-              <a:t> </a:t>
-            </a:r>
-            <a:r>
-              <a:rPr lang="en-US" dirty="0" smtClean="0"/>
-              <a:t>– 2xy + </a:t>
-            </a:r>
-            <a:r>
-              <a:rPr lang="en-US" dirty="0" smtClean="0"/>
-              <a:t>c</a:t>
+              <a:t> – 2xy + c</a:t>
             </a:r>
             <a:r>
               <a:rPr lang="en-US" baseline="30000" dirty="0"/>
@@ -5942,11 +5675,7 @@
             <a:pPr lvl="2"/>
             <a:r>
               <a:rPr lang="en-US" dirty="0" smtClean="0"/>
-              <a:t>Note that </a:t>
-            </a:r>
-            <a:r>
-              <a:rPr lang="en-US" dirty="0" smtClean="0"/>
-              <a:t>x</a:t>
+              <a:t>Note that x</a:t>
             </a:r>
             <a:r>
               <a:rPr lang="en-US" baseline="30000" dirty="0"/>
@@ -5962,11 +5691,7 @@
             </a:r>
             <a:r>
               <a:rPr lang="en-US" dirty="0" smtClean="0"/>
-              <a:t> </a:t>
-            </a:r>
-            <a:r>
-              <a:rPr lang="en-US" dirty="0" smtClean="0"/>
-              <a:t>= ((</a:t>
+              <a:t> = ((</a:t>
             </a:r>
             <a:r>
               <a:rPr lang="en-US" dirty="0" err="1" smtClean="0"/>
@@ -5982,15 +5707,7 @@
             </a:r>
             <a:r>
               <a:rPr lang="en-US" dirty="0" smtClean="0"/>
-              <a:t> </a:t>
-            </a:r>
-            <a:r>
-              <a:rPr lang="en-US" dirty="0" smtClean="0"/>
-              <a:t>+ (</a:t>
-            </a:r>
-            <a:r>
-              <a:rPr lang="en-US" dirty="0" smtClean="0"/>
-              <a:t>x-y)</a:t>
+              <a:t> + (x-y)</a:t>
             </a:r>
             <a:r>
               <a:rPr lang="en-US" baseline="30000" dirty="0" smtClean="0"/>
@@ -5998,15 +5715,7 @@
             </a:r>
             <a:r>
               <a:rPr lang="en-US" dirty="0" smtClean="0"/>
-              <a:t> </a:t>
-            </a:r>
-            <a:r>
-              <a:rPr lang="en-US" dirty="0" smtClean="0"/>
-              <a:t>– (</a:t>
-            </a:r>
-            <a:r>
-              <a:rPr lang="en-US" dirty="0" smtClean="0"/>
-              <a:t>2x</a:t>
+              <a:t> – (2x</a:t>
             </a:r>
             <a:r>
               <a:rPr lang="en-US" baseline="30000" dirty="0"/>
@@ -6014,15 +5723,7 @@
             </a:r>
             <a:r>
               <a:rPr lang="en-US" dirty="0" smtClean="0"/>
-              <a:t> </a:t>
-            </a:r>
-            <a:r>
-              <a:rPr lang="en-US" dirty="0" smtClean="0"/>
-              <a:t>+ </a:t>
-            </a:r>
-            <a:r>
-              <a:rPr lang="en-US" dirty="0" smtClean="0"/>
-              <a:t>2y</a:t>
+              <a:t> + 2y</a:t>
             </a:r>
             <a:r>
               <a:rPr lang="en-US" baseline="30000" dirty="0"/>
@@ -6030,22 +5731,14 @@
             </a:r>
             <a:r>
               <a:rPr lang="en-US" dirty="0" smtClean="0"/>
-              <a:t>))/</a:t>
-            </a:r>
-            <a:r>
-              <a:rPr lang="en-US" dirty="0" smtClean="0"/>
-              <a:t>12</a:t>
+              <a:t>))/12</a:t>
             </a:r>
           </a:p>
           <a:p>
             <a:pPr lvl="2"/>
             <a:r>
               <a:rPr lang="en-US" dirty="0" smtClean="0"/>
-              <a:t>So </a:t>
-            </a:r>
-            <a:r>
-              <a:rPr lang="en-US" dirty="0" smtClean="0"/>
-              <a:t>x</a:t>
+              <a:t>So x</a:t>
             </a:r>
             <a:r>
               <a:rPr lang="en-US" baseline="30000" dirty="0"/>
@@ -6061,15 +5754,7 @@
             </a:r>
             <a:r>
               <a:rPr lang="en-US" dirty="0" smtClean="0"/>
-              <a:t> </a:t>
-            </a:r>
-            <a:r>
-              <a:rPr lang="en-US" dirty="0" smtClean="0"/>
-              <a:t>= (</a:t>
-            </a:r>
-            <a:r>
-              <a:rPr lang="en-US" dirty="0" smtClean="0"/>
-              <a:t>u</a:t>
+              <a:t> = (u</a:t>
             </a:r>
             <a:r>
               <a:rPr lang="en-US" baseline="30000" dirty="0" smtClean="0"/>
@@ -6077,15 +5762,7 @@
             </a:r>
             <a:r>
               <a:rPr lang="en-US" dirty="0" smtClean="0"/>
-              <a:t> </a:t>
-            </a:r>
-            <a:r>
-              <a:rPr lang="en-US" dirty="0" smtClean="0"/>
-              <a:t>+ </a:t>
-            </a:r>
-            <a:r>
-              <a:rPr lang="en-US" dirty="0" smtClean="0"/>
-              <a:t>v</a:t>
+              <a:t> + v</a:t>
             </a:r>
             <a:r>
               <a:rPr lang="en-US" baseline="30000" dirty="0" smtClean="0"/>
@@ -6093,15 +5770,7 @@
             </a:r>
             <a:r>
               <a:rPr lang="en-US" dirty="0" smtClean="0"/>
-              <a:t>) </a:t>
-            </a:r>
-            <a:r>
-              <a:rPr lang="en-US" dirty="0" smtClean="0"/>
-              <a:t>* 4 / 3 – (</a:t>
-            </a:r>
-            <a:r>
-              <a:rPr lang="en-US" dirty="0" smtClean="0"/>
-              <a:t>x</a:t>
+              <a:t>) * 4 / 3 – (x</a:t>
             </a:r>
             <a:r>
               <a:rPr lang="en-US" baseline="30000" dirty="0"/>
@@ -6109,15 +5778,7 @@
             </a:r>
             <a:r>
               <a:rPr lang="en-US" dirty="0" smtClean="0"/>
-              <a:t> </a:t>
-            </a:r>
-            <a:r>
-              <a:rPr lang="en-US" dirty="0" smtClean="0"/>
-              <a:t>+ </a:t>
-            </a:r>
-            <a:r>
-              <a:rPr lang="en-US" dirty="0" smtClean="0"/>
-              <a:t>y</a:t>
+              <a:t> + y</a:t>
             </a:r>
             <a:r>
               <a:rPr lang="en-US" baseline="30000" dirty="0"/>
@@ -6125,15 +5786,7 @@
             </a:r>
             <a:r>
               <a:rPr lang="en-US" dirty="0" smtClean="0"/>
-              <a:t>) </a:t>
-            </a:r>
-            <a:r>
-              <a:rPr lang="en-US" dirty="0" smtClean="0"/>
-              <a:t>/ </a:t>
-            </a:r>
-            <a:r>
-              <a:rPr lang="en-US" dirty="0" smtClean="0"/>
-              <a:t>6, u = (</a:t>
+              <a:t>) / 6, u = (</a:t>
             </a:r>
             <a:r>
               <a:rPr lang="en-US" dirty="0" err="1" smtClean="0"/>
@@ -6143,7 +5796,6 @@
               <a:rPr lang="en-US" dirty="0" smtClean="0"/>
               <a:t>)/2, v = (x-y)/2</a:t>
             </a:r>
-            <a:endParaRPr lang="en-US" dirty="0" smtClean="0"/>
           </a:p>
           <a:p>
             <a:pPr lvl="1"/>
@@ -6156,15 +5808,7 @@
             <a:pPr lvl="1"/>
             <a:r>
               <a:rPr lang="en-US" dirty="0" smtClean="0"/>
-              <a:t>However, we end up with </a:t>
-            </a:r>
-            <a:r>
-              <a:rPr lang="en-US" dirty="0" smtClean="0"/>
-              <a:t>much more complex </a:t>
-            </a:r>
-            <a:r>
-              <a:rPr lang="en-US" dirty="0" smtClean="0"/>
-              <a:t>models (with lots of SOS2 constraints)</a:t>
+              <a:t>However, we end up with much more complex models (with lots of SOS2 constraints)</a:t>
             </a:r>
           </a:p>
           <a:p>
@@ -6197,8 +5841,12 @@
               <a:buSzPct val="85000"/>
             </a:pPr>
             <a:r>
-              <a:rPr lang="el-GR" dirty="0"/>
+              <a:rPr lang="el-GR" dirty="0" smtClean="0"/>
               <a:t>Σ</a:t>
+            </a:r>
+            <a:r>
+              <a:rPr lang="en-US" baseline="-25000" dirty="0"/>
+              <a:t>i </a:t>
             </a:r>
             <a:r>
               <a:rPr lang="en-US" dirty="0" smtClean="0"/>
@@ -6210,11 +5858,7 @@
             </a:r>
             <a:r>
               <a:rPr lang="en-US" dirty="0" smtClean="0"/>
-              <a:t>[</a:t>
-            </a:r>
-            <a:r>
-              <a:rPr lang="en-US" dirty="0" err="1" smtClean="0"/>
-              <a:t>i</a:t>
+              <a:t>[i</a:t>
             </a:r>
             <a:r>
               <a:rPr lang="en-US" dirty="0"/>
@@ -6230,15 +5874,7 @@
             </a:r>
             <a:r>
               <a:rPr lang="en-US" dirty="0"/>
-              <a:t> Gen[</a:t>
-            </a:r>
-            <a:r>
-              <a:rPr lang="en-US" dirty="0" err="1"/>
-              <a:t>i</a:t>
-            </a:r>
-            <a:r>
-              <a:rPr lang="en-US" dirty="0"/>
-              <a:t>] – </a:t>
+              <a:t> Gen[i] – </a:t>
             </a:r>
             <a:r>
               <a:rPr lang="en-US" dirty="0" err="1"/>
@@ -6246,15 +5882,7 @@
             </a:r>
             <a:r>
               <a:rPr lang="en-US" dirty="0"/>
-              <a:t>*[</a:t>
-            </a:r>
-            <a:r>
-              <a:rPr lang="en-US" dirty="0" err="1"/>
-              <a:t>i</a:t>
-            </a:r>
-            <a:r>
-              <a:rPr lang="en-US" dirty="0"/>
-              <a:t>] </a:t>
+              <a:t>*[i] </a:t>
             </a:r>
             <a:r>
               <a:rPr lang="en-US" dirty="0">
@@ -6356,16 +5984,12 @@
           </a:p>
           <a:p>
             <a:r>
-              <a:rPr lang="en-US" dirty="0" err="1"/>
+              <a:rPr lang="en-US" dirty="0" err="1" smtClean="0"/>
               <a:t>qo</a:t>
             </a:r>
             <a:r>
-              <a:rPr lang="en-US" dirty="0"/>
-              <a:t>[</a:t>
-            </a:r>
-            <a:r>
-              <a:rPr lang="en-US" dirty="0" err="1"/>
-              <a:t>i</a:t>
+              <a:rPr lang="en-US" dirty="0" smtClean="0"/>
+              <a:t>[i</a:t>
             </a:r>
             <a:r>
               <a:rPr lang="en-US" dirty="0"/>
@@ -6425,31 +6049,7 @@
             </a:r>
             <a:r>
               <a:rPr lang="en-US" dirty="0"/>
-              <a:t>_{</a:t>
-            </a:r>
-            <a:r>
-              <a:rPr lang="en-US" dirty="0" err="1"/>
-              <a:t>i</a:t>
-            </a:r>
-            <a:r>
-              <a:rPr lang="en-US" dirty="0"/>
-              <a:t>}'.format(</a:t>
-            </a:r>
-            <a:r>
-              <a:rPr lang="en-US" dirty="0" err="1"/>
-              <a:t>i</a:t>
-            </a:r>
-            <a:r>
-              <a:rPr lang="en-US" dirty="0"/>
-              <a:t> = </a:t>
-            </a:r>
-            <a:r>
-              <a:rPr lang="en-US" dirty="0" err="1"/>
-              <a:t>i</a:t>
-            </a:r>
-            <a:r>
-              <a:rPr lang="en-US" dirty="0"/>
-              <a:t>))</a:t>
+              <a:t>_{i}'.format(i = i))</a:t>
             </a:r>
           </a:p>
           <a:p>
@@ -6475,15 +6075,7 @@
             </a:r>
             <a:r>
               <a:rPr lang="en-US" dirty="0"/>
-              <a:t>[</a:t>
-            </a:r>
-            <a:r>
-              <a:rPr lang="en-US" dirty="0" err="1"/>
-              <a:t>i</a:t>
-            </a:r>
-            <a:r>
-              <a:rPr lang="en-US" dirty="0"/>
-              <a:t>] == </a:t>
+              <a:t>[i] == </a:t>
             </a:r>
             <a:r>
               <a:rPr lang="en-US" dirty="0" err="1"/>
@@ -6491,15 +6083,7 @@
             </a:r>
             <a:r>
               <a:rPr lang="en-US" dirty="0"/>
-              <a:t>[</a:t>
-            </a:r>
-            <a:r>
-              <a:rPr lang="en-US" dirty="0" err="1"/>
-              <a:t>i</a:t>
-            </a:r>
-            <a:r>
-              <a:rPr lang="en-US" dirty="0"/>
-              <a:t>] + </a:t>
+              <a:t>[i] + </a:t>
             </a:r>
             <a:r>
               <a:rPr lang="en-US" dirty="0" err="1"/>
@@ -6507,15 +6091,7 @@
             </a:r>
             <a:r>
               <a:rPr lang="en-US" dirty="0"/>
-              <a:t>[</a:t>
-            </a:r>
-            <a:r>
-              <a:rPr lang="en-US" dirty="0" err="1"/>
-              <a:t>i</a:t>
-            </a:r>
-            <a:r>
-              <a:rPr lang="en-US" dirty="0"/>
-              <a:t>],</a:t>
+              <a:t>[i],</a:t>
             </a:r>
             <a:r>
               <a:rPr lang="en-US" dirty="0" smtClean="0"/>
@@ -6530,28 +6106,8 @@
               <a:t>_{</a:t>
             </a:r>
             <a:r>
-              <a:rPr lang="en-US" dirty="0" err="1"/>
-              <a:t>i</a:t>
-            </a:r>
-            <a:r>
               <a:rPr lang="en-US" dirty="0"/>
-              <a:t>}'.format(</a:t>
-            </a:r>
-            <a:r>
-              <a:rPr lang="en-US" dirty="0" err="1"/>
-              <a:t>i</a:t>
-            </a:r>
-            <a:r>
-              <a:rPr lang="en-US" dirty="0"/>
-              <a:t>=</a:t>
-            </a:r>
-            <a:r>
-              <a:rPr lang="en-US" dirty="0" err="1"/>
-              <a:t>i</a:t>
-            </a:r>
-            <a:r>
-              <a:rPr lang="en-US" dirty="0"/>
-              <a:t>))</a:t>
+              <a:t>i}'.format(i=i))</a:t>
             </a:r>
           </a:p>
           <a:p>
@@ -6923,15 +6479,7 @@
           <a:p>
             <a:r>
               <a:rPr lang="en-US" dirty="0" smtClean="0"/>
-              <a:t>Optimizer </a:t>
-            </a:r>
-            <a:r>
-              <a:rPr lang="en-US" dirty="0" smtClean="0"/>
-              <a:t>purposely maintains </a:t>
-            </a:r>
-            <a:r>
-              <a:rPr lang="en-US" dirty="0" smtClean="0"/>
-              <a:t>a high </a:t>
+              <a:t>Optimizer purposely maintains a high </a:t>
             </a:r>
             <a:r>
               <a:rPr lang="en-US" dirty="0" err="1" smtClean="0"/>
@@ -6945,11 +6493,7 @@
           <a:p>
             <a:r>
               <a:rPr lang="en-US" dirty="0" smtClean="0"/>
-              <a:t>&lt;10</a:t>
-            </a:r>
-            <a:r>
-              <a:rPr lang="en-US" dirty="0" smtClean="0"/>
-              <a:t> </a:t>
+              <a:t>&lt;10 </a:t>
             </a:r>
             <a:r>
               <a:rPr lang="en-US" dirty="0" err="1" smtClean="0"/>
@@ -6957,11 +6501,7 @@
             </a:r>
             <a:r>
               <a:rPr lang="en-US" dirty="0" smtClean="0"/>
-              <a:t> to </a:t>
-            </a:r>
-            <a:r>
-              <a:rPr lang="en-US" dirty="0" smtClean="0"/>
-              <a:t>optimize a three-month model</a:t>
+              <a:t> to optimize a three-month model</a:t>
             </a:r>
           </a:p>
           <a:p>

</xml_diff>